<commit_message>
Add comments to List member functions
</commit_message>
<xml_diff>
--- a/doc/MasterCoders.pptx
+++ b/doc/MasterCoders.pptx
@@ -20,34 +20,34 @@
   <p:notesSz cx="6858000" cy="9144000"/>
   <p:embeddedFontLst>
     <p:embeddedFont>
-      <p:font typeface="Albert Sans" panose="020B0604020202020204" charset="0"/>
+      <p:font typeface="Anaheim" charset="0"/>
       <p:regular r:id="rId10"/>
-      <p:bold r:id="rId11"/>
-      <p:italic r:id="rId12"/>
-      <p:boldItalic r:id="rId13"/>
     </p:embeddedFont>
     <p:embeddedFont>
-      <p:font typeface="Anaheim" panose="020B0604020202020204" charset="0"/>
-      <p:regular r:id="rId14"/>
+      <p:font typeface="Albert Sans" charset="0"/>
+      <p:regular r:id="rId11"/>
+      <p:bold r:id="rId12"/>
+      <p:italic r:id="rId13"/>
+      <p:boldItalic r:id="rId14"/>
     </p:embeddedFont>
     <p:embeddedFont>
-      <p:font typeface="Arial Rounded MT Bold" panose="020F0704030504030204" pitchFamily="34" charset="0"/>
+      <p:font typeface="Epilogue" charset="0"/>
       <p:regular r:id="rId15"/>
+      <p:bold r:id="rId16"/>
+      <p:italic r:id="rId17"/>
+      <p:boldItalic r:id="rId18"/>
     </p:embeddedFont>
     <p:embeddedFont>
-      <p:font typeface="Bebas Neue" panose="020B0606020202050201" pitchFamily="34" charset="0"/>
-      <p:regular r:id="rId16"/>
+      <p:font typeface="Caveat Brush" charset="0"/>
+      <p:regular r:id="rId19"/>
     </p:embeddedFont>
     <p:embeddedFont>
-      <p:font typeface="Caveat Brush" pitchFamily="2" charset="0"/>
-      <p:regular r:id="rId17"/>
+      <p:font typeface="Arial Rounded MT Bold" pitchFamily="34" charset="0"/>
+      <p:regular r:id="rId20"/>
     </p:embeddedFont>
     <p:embeddedFont>
-      <p:font typeface="Epilogue" panose="020B0604020202020204" charset="0"/>
-      <p:regular r:id="rId18"/>
-      <p:bold r:id="rId19"/>
-      <p:italic r:id="rId20"/>
-      <p:boldItalic r:id="rId21"/>
+      <p:font typeface="Bebas Neue" charset="0"/>
+      <p:regular r:id="rId21"/>
     </p:embeddedFont>
   </p:embeddedFontLst>
   <p:defaultTextStyle>
@@ -281,7 +281,7 @@
   </p:defaultTextStyle>
   <p:extLst>
     <p:ext uri="{EFAFB233-063F-42B5-8137-9DF3F51BA10A}">
-      <p15:sldGuideLst xmlns:p15="http://schemas.microsoft.com/office/powerpoint/2012/main"/>
+      <p15:sldGuideLst xmlns:p15="http://schemas.microsoft.com/office/powerpoint/2012/main" xmlns=""/>
     </p:ext>
   </p:extLst>
 </p:presentation>
@@ -494,6 +494,11 @@
         </p:txBody>
       </p:sp>
     </p:spTree>
+    <p:extLst>
+      <p:ext uri="{BB962C8B-B14F-4D97-AF65-F5344CB8AC3E}">
+        <p14:creationId xmlns:p14="http://schemas.microsoft.com/office/powerpoint/2010/main" val="985078365"/>
+      </p:ext>
+    </p:extLst>
   </p:cSld>
   <p:clrMap bg1="lt1" tx1="dk1" bg2="dk2" tx2="lt2" accent1="accent1" accent2="accent2" accent3="accent3" accent4="accent4" accent5="accent5" accent6="accent6" hlink="hlink" folHlink="folHlink"/>
   <p:notesStyle>
@@ -6235,7 +6240,7 @@
           <p:cNvPr id="3" name="Картина 2" descr="Картина, която съдържа символ, лого, черен, емблема&#10;&#10;Генерираното от ИИ съдържание може да е неправилно.">
             <a:extLst>
               <a:ext uri="{FF2B5EF4-FFF2-40B4-BE49-F238E27FC236}">
-                <a16:creationId xmlns:a16="http://schemas.microsoft.com/office/drawing/2014/main" id="{D0DD8326-143E-A111-FCB0-3D1FD031777B}"/>
+                <a16:creationId xmlns:a16="http://schemas.microsoft.com/office/drawing/2014/main" xmlns="" id="{D0DD8326-143E-A111-FCB0-3D1FD031777B}"/>
               </a:ext>
             </a:extLst>
           </p:cNvPr>
@@ -6744,7 +6749,7 @@
         <p:spPr>
           <a:xfrm>
             <a:off x="-301106" y="1512541"/>
-            <a:ext cx="9372238" cy="2893100"/>
+            <a:ext cx="9372238" cy="2677656"/>
           </a:xfrm>
           <a:prstGeom prst="rect">
             <a:avLst/>
@@ -6759,12 +6764,17 @@
             <a:pPr algn="ctr"/>
             <a:r>
               <a:rPr lang="en-US" dirty="0"/>
-              <a:t>IVELIN VOYNOV- Scrum Trainer</a:t>
+              <a:t>IVELIN VOYNOV- Scrum </a:t>
             </a:r>
+            <a:r>
+              <a:rPr lang="en-US" dirty="0" smtClean="0"/>
+              <a:t>Trainer</a:t>
+            </a:r>
+            <a:endParaRPr lang="en-US" dirty="0"/>
           </a:p>
           <a:p>
             <a:pPr algn="ctr"/>
-            <a:endParaRPr lang="en-US" dirty="0"/>
+            <a:endParaRPr lang="en-US" dirty="0" smtClean="0"/>
           </a:p>
           <a:p>
             <a:pPr algn="ctr"/>
@@ -6774,16 +6784,17 @@
             <a:pPr algn="ctr"/>
             <a:r>
               <a:rPr lang="en-US" dirty="0"/>
-              <a:t>DANIEL KOSTADINOV- QA Engineer</a:t>
+              <a:t>DANIEL KOSTADINOV- QA </a:t>
             </a:r>
-          </a:p>
-          <a:p>
-            <a:pPr algn="ctr"/>
+            <a:r>
+              <a:rPr lang="en-US" dirty="0" smtClean="0"/>
+              <a:t>Engineer</a:t>
+            </a:r>
             <a:endParaRPr lang="en-US" dirty="0"/>
           </a:p>
           <a:p>
             <a:pPr algn="ctr"/>
-            <a:endParaRPr lang="en-US" dirty="0"/>
+            <a:endParaRPr lang="en-US" dirty="0" smtClean="0"/>
           </a:p>
           <a:p>
             <a:pPr algn="ctr"/>
@@ -6793,12 +6804,17 @@
             <a:pPr algn="ctr"/>
             <a:r>
               <a:rPr lang="en-US" dirty="0"/>
-              <a:t>ALEXANDER LALEV- Backend Developer</a:t>
+              <a:t>ALEXANDER LALEV- Backend </a:t>
             </a:r>
+            <a:r>
+              <a:rPr lang="en-US" dirty="0" smtClean="0"/>
+              <a:t>Developer</a:t>
+            </a:r>
+            <a:endParaRPr lang="en-US" dirty="0"/>
           </a:p>
           <a:p>
             <a:pPr algn="ctr"/>
-            <a:endParaRPr lang="en-US" dirty="0"/>
+            <a:endParaRPr lang="en-US" smtClean="0"/>
           </a:p>
           <a:p>
             <a:pPr algn="ctr"/>
@@ -6847,10 +6863,10 @@
       </p:pic>
       <p:pic>
         <p:nvPicPr>
-          <p:cNvPr id="3" name="Picture 7" descr="A child in a blue shirt&#10;&#10;Description automatically generated">
+          <p:cNvPr id="5" name="Картина 4" descr="Картина, която съдържа символ, лого, черен, емблема&#10;&#10;Генерираното от ИИ съдържание може да е неправилно.">
             <a:extLst>
               <a:ext uri="{FF2B5EF4-FFF2-40B4-BE49-F238E27FC236}">
-                <a16:creationId xmlns:a16="http://schemas.microsoft.com/office/drawing/2014/main" id="{713D8EBA-5A5E-BAD2-7E96-C4428EEA6BFD}"/>
+                <a16:creationId xmlns:a16="http://schemas.microsoft.com/office/drawing/2014/main" xmlns="" id="{E67D469B-B1FA-B825-AD1C-9D1C094FB371}"/>
               </a:ext>
             </a:extLst>
           </p:cNvPr>
@@ -6860,115 +6876,7 @@
           <p:nvPr/>
         </p:nvPicPr>
         <p:blipFill>
-          <a:blip r:embed="rId3"/>
-          <a:stretch>
-            <a:fillRect/>
-          </a:stretch>
-        </p:blipFill>
-        <p:spPr>
-          <a:xfrm>
-            <a:off x="5984738" y="1970776"/>
-            <a:ext cx="814824" cy="814824"/>
-          </a:xfrm>
-          <a:prstGeom prst="ellipse">
-            <a:avLst/>
-          </a:prstGeom>
-          <a:ln w="63500" cap="rnd">
-            <a:solidFill>
-              <a:srgbClr val="333333"/>
-            </a:solidFill>
-          </a:ln>
-          <a:effectLst>
-            <a:outerShdw blurRad="381000" dist="292100" dir="5400000" sx="-80000" sy="-18000" rotWithShape="0">
-              <a:srgbClr val="000000">
-                <a:alpha val="22000"/>
-              </a:srgbClr>
-            </a:outerShdw>
-          </a:effectLst>
-          <a:scene3d>
-            <a:camera prst="orthographicFront"/>
-            <a:lightRig rig="contrasting" dir="t">
-              <a:rot lat="0" lon="0" rev="3000000"/>
-            </a:lightRig>
-          </a:scene3d>
-          <a:sp3d contourW="7620">
-            <a:bevelT w="95250" h="31750"/>
-            <a:contourClr>
-              <a:srgbClr val="333333"/>
-            </a:contourClr>
-          </a:sp3d>
-        </p:spPr>
-      </p:pic>
-      <p:pic>
-        <p:nvPicPr>
-          <p:cNvPr id="4" name="Picture 11" descr="A person in a white shirt&#10;&#10;Description automatically generated">
-            <a:extLst>
-              <a:ext uri="{FF2B5EF4-FFF2-40B4-BE49-F238E27FC236}">
-                <a16:creationId xmlns:a16="http://schemas.microsoft.com/office/drawing/2014/main" id="{2258DB0B-84B4-C8C7-AA74-F26E9E74DF73}"/>
-              </a:ext>
-            </a:extLst>
-          </p:cNvPr>
-          <p:cNvPicPr>
-            <a:picLocks noChangeAspect="1"/>
-          </p:cNvPicPr>
-          <p:nvPr/>
-        </p:nvPicPr>
-        <p:blipFill>
-          <a:blip r:embed="rId4"/>
-          <a:stretch>
-            <a:fillRect/>
-          </a:stretch>
-        </p:blipFill>
-        <p:spPr>
-          <a:xfrm>
-            <a:off x="2162713" y="1195048"/>
-            <a:ext cx="814825" cy="814825"/>
-          </a:xfrm>
-          <a:prstGeom prst="ellipse">
-            <a:avLst/>
-          </a:prstGeom>
-          <a:ln w="63500" cap="rnd">
-            <a:solidFill>
-              <a:srgbClr val="333333"/>
-            </a:solidFill>
-          </a:ln>
-          <a:effectLst>
-            <a:outerShdw blurRad="381000" dist="292100" dir="5400000" sx="-80000" sy="-18000" rotWithShape="0">
-              <a:srgbClr val="000000">
-                <a:alpha val="22000"/>
-              </a:srgbClr>
-            </a:outerShdw>
-          </a:effectLst>
-          <a:scene3d>
-            <a:camera prst="orthographicFront"/>
-            <a:lightRig rig="contrasting" dir="t">
-              <a:rot lat="0" lon="0" rev="3000000"/>
-            </a:lightRig>
-          </a:scene3d>
-          <a:sp3d contourW="7620">
-            <a:bevelT w="95250" h="31750"/>
-            <a:contourClr>
-              <a:srgbClr val="333333"/>
-            </a:contourClr>
-          </a:sp3d>
-        </p:spPr>
-      </p:pic>
-      <p:pic>
-        <p:nvPicPr>
-          <p:cNvPr id="5" name="Картина 4" descr="Картина, която съдържа символ, лого, черен, емблема&#10;&#10;Генерираното от ИИ съдържание може да е неправилно.">
-            <a:extLst>
-              <a:ext uri="{FF2B5EF4-FFF2-40B4-BE49-F238E27FC236}">
-                <a16:creationId xmlns:a16="http://schemas.microsoft.com/office/drawing/2014/main" id="{E67D469B-B1FA-B825-AD1C-9D1C094FB371}"/>
-              </a:ext>
-            </a:extLst>
-          </p:cNvPr>
-          <p:cNvPicPr>
-            <a:picLocks noChangeAspect="1"/>
-          </p:cNvPicPr>
-          <p:nvPr/>
-        </p:nvPicPr>
-        <p:blipFill>
-          <a:blip r:embed="rId5">
+          <a:blip r:embed="rId3">
             <a:extLst>
               <a:ext uri="{28A0092B-C50C-407E-A947-70E740481C1C}">
                 <a14:useLocalDpi xmlns:a14="http://schemas.microsoft.com/office/drawing/2010/main" val="0"/>
@@ -7018,114 +6926,6 @@
               </a:path>
             </a:pathLst>
           </a:custGeom>
-        </p:spPr>
-      </p:pic>
-      <p:pic>
-        <p:nvPicPr>
-          <p:cNvPr id="12" name="Картина 11" descr="Картина, която съдържа човек, Човешко лице, вежда, Чело&#10;&#10;Генерираното от ИИ съдържание може да е неправилно.">
-            <a:extLst>
-              <a:ext uri="{FF2B5EF4-FFF2-40B4-BE49-F238E27FC236}">
-                <a16:creationId xmlns:a16="http://schemas.microsoft.com/office/drawing/2014/main" id="{7031E932-662A-BE3C-EF7F-18BE0F4011B6}"/>
-              </a:ext>
-            </a:extLst>
-          </p:cNvPr>
-          <p:cNvPicPr>
-            <a:picLocks noChangeAspect="1"/>
-          </p:cNvPicPr>
-          <p:nvPr/>
-        </p:nvPicPr>
-        <p:blipFill>
-          <a:blip r:embed="rId6"/>
-          <a:stretch>
-            <a:fillRect/>
-          </a:stretch>
-        </p:blipFill>
-        <p:spPr>
-          <a:xfrm>
-            <a:off x="1857650" y="2787005"/>
-            <a:ext cx="820576" cy="693245"/>
-          </a:xfrm>
-          <a:prstGeom prst="ellipse">
-            <a:avLst/>
-          </a:prstGeom>
-          <a:ln w="63500" cap="rnd">
-            <a:solidFill>
-              <a:srgbClr val="333333"/>
-            </a:solidFill>
-          </a:ln>
-          <a:effectLst>
-            <a:outerShdw blurRad="381000" dist="292100" dir="5400000" sx="-80000" sy="-18000" rotWithShape="0">
-              <a:srgbClr val="000000">
-                <a:alpha val="22000"/>
-              </a:srgbClr>
-            </a:outerShdw>
-          </a:effectLst>
-          <a:scene3d>
-            <a:camera prst="orthographicFront"/>
-            <a:lightRig rig="contrasting" dir="t">
-              <a:rot lat="0" lon="0" rev="3000000"/>
-            </a:lightRig>
-          </a:scene3d>
-          <a:sp3d contourW="7620">
-            <a:bevelT w="95250" h="31750"/>
-            <a:contourClr>
-              <a:srgbClr val="333333"/>
-            </a:contourClr>
-          </a:sp3d>
-        </p:spPr>
-      </p:pic>
-      <p:pic>
-        <p:nvPicPr>
-          <p:cNvPr id="13" name="Картина 12" descr="Картина, която съдържа Човешко лице, човек, мъж, дрехи&#10;&#10;Генерираното от ИИ съдържание може да е неправилно.">
-            <a:extLst>
-              <a:ext uri="{FF2B5EF4-FFF2-40B4-BE49-F238E27FC236}">
-                <a16:creationId xmlns:a16="http://schemas.microsoft.com/office/drawing/2014/main" id="{1602F0F2-3753-4A2A-0BD7-178248E04D53}"/>
-              </a:ext>
-            </a:extLst>
-          </p:cNvPr>
-          <p:cNvPicPr>
-            <a:picLocks noChangeAspect="1"/>
-          </p:cNvPicPr>
-          <p:nvPr/>
-        </p:nvPicPr>
-        <p:blipFill>
-          <a:blip r:embed="rId7"/>
-          <a:stretch>
-            <a:fillRect/>
-          </a:stretch>
-        </p:blipFill>
-        <p:spPr>
-          <a:xfrm>
-            <a:off x="6236572" y="3470320"/>
-            <a:ext cx="674607" cy="753873"/>
-          </a:xfrm>
-          <a:prstGeom prst="ellipse">
-            <a:avLst/>
-          </a:prstGeom>
-          <a:ln w="63500" cap="rnd">
-            <a:solidFill>
-              <a:srgbClr val="333333"/>
-            </a:solidFill>
-          </a:ln>
-          <a:effectLst>
-            <a:outerShdw blurRad="381000" dist="292100" dir="5400000" sx="-80000" sy="-18000" rotWithShape="0">
-              <a:srgbClr val="000000">
-                <a:alpha val="22000"/>
-              </a:srgbClr>
-            </a:outerShdw>
-          </a:effectLst>
-          <a:scene3d>
-            <a:camera prst="orthographicFront"/>
-            <a:lightRig rig="contrasting" dir="t">
-              <a:rot lat="0" lon="0" rev="3000000"/>
-            </a:lightRig>
-          </a:scene3d>
-          <a:sp3d contourW="7620">
-            <a:bevelT w="95250" h="31750"/>
-            <a:contourClr>
-              <a:srgbClr val="333333"/>
-            </a:contourClr>
-          </a:sp3d>
         </p:spPr>
       </p:pic>
     </p:spTree>
@@ -7252,7 +7052,7 @@
           <p:cNvPr id="5" name="Картина 4" descr="Картина, която съдържа символ, лого, черен, емблема&#10;&#10;Генерираното от ИИ съдържание може да е неправилно.">
             <a:extLst>
               <a:ext uri="{FF2B5EF4-FFF2-40B4-BE49-F238E27FC236}">
-                <a16:creationId xmlns:a16="http://schemas.microsoft.com/office/drawing/2014/main" id="{E83FC2E6-1169-CEC8-14CD-A5B36CB3F8D6}"/>
+                <a16:creationId xmlns:a16="http://schemas.microsoft.com/office/drawing/2014/main" xmlns="" id="{E83FC2E6-1169-CEC8-14CD-A5B36CB3F8D6}"/>
               </a:ext>
             </a:extLst>
           </p:cNvPr>
@@ -7986,7 +7786,7 @@
           <p:cNvPr id="3" name="Picture 6" descr="A red and black sign&#10;&#10;Description automatically generated">
             <a:extLst>
               <a:ext uri="{FF2B5EF4-FFF2-40B4-BE49-F238E27FC236}">
-                <a16:creationId xmlns:a16="http://schemas.microsoft.com/office/drawing/2014/main" id="{F473C038-127E-F927-444B-E2642444F444}"/>
+                <a16:creationId xmlns:a16="http://schemas.microsoft.com/office/drawing/2014/main" xmlns="" id="{F473C038-127E-F927-444B-E2642444F444}"/>
               </a:ext>
             </a:extLst>
           </p:cNvPr>

</xml_diff>